<commit_message>
A few more slides
</commit_message>
<xml_diff>
--- a/Final-Presentation.pptx
+++ b/Final-Presentation.pptx
@@ -10,6 +10,10 @@
     <p:sldId id="258" r:id="rId4"/>
     <p:sldId id="259" r:id="rId5"/>
     <p:sldId id="260" r:id="rId6"/>
+    <p:sldId id="261" r:id="rId7"/>
+    <p:sldId id="262" r:id="rId8"/>
+    <p:sldId id="263" r:id="rId9"/>
+    <p:sldId id="264" r:id="rId10"/>
   </p:sldIdLst>
   <p:sldSz cx="12192000" cy="6858000"/>
   <p:notesSz cx="6858000" cy="9144000"/>
@@ -3851,6 +3855,359 @@
 </p:sld>
 </file>
 
+<file path=ppt/slides/slide6.xml><?xml version="1.0" encoding="utf-8"?>
+<p:sld xmlns:a="http://schemas.openxmlformats.org/drawingml/2006/main" xmlns:r="http://schemas.openxmlformats.org/officeDocument/2006/relationships" xmlns:p="http://schemas.openxmlformats.org/presentationml/2006/main">
+  <p:cSld>
+    <p:spTree>
+      <p:nvGrpSpPr>
+        <p:cNvPr id="1" name=""/>
+        <p:cNvGrpSpPr/>
+        <p:nvPr/>
+      </p:nvGrpSpPr>
+      <p:grpSpPr>
+        <a:xfrm>
+          <a:off x="0" y="0"/>
+          <a:ext cx="0" cy="0"/>
+          <a:chOff x="0" y="0"/>
+          <a:chExt cx="0" cy="0"/>
+        </a:xfrm>
+      </p:grpSpPr>
+      <p:sp>
+        <p:nvSpPr>
+          <p:cNvPr id="2" name="Title 1">
+            <a:extLst>
+              <a:ext uri="{FF2B5EF4-FFF2-40B4-BE49-F238E27FC236}">
+                <a16:creationId xmlns:a16="http://schemas.microsoft.com/office/drawing/2014/main" id="{8CD52B8C-8426-49F4-AC7E-2AD658F417D4}"/>
+              </a:ext>
+            </a:extLst>
+          </p:cNvPr>
+          <p:cNvSpPr>
+            <a:spLocks noGrp="1"/>
+          </p:cNvSpPr>
+          <p:nvPr>
+            <p:ph type="title"/>
+          </p:nvPr>
+        </p:nvSpPr>
+        <p:spPr/>
+        <p:txBody>
+          <a:bodyPr/>
+          <a:lstStyle/>
+          <a:p>
+            <a:r>
+              <a:rPr lang="en-US" dirty="0"/>
+              <a:t>Project Infrastructure &amp; Software</a:t>
+            </a:r>
+          </a:p>
+        </p:txBody>
+      </p:sp>
+      <p:sp>
+        <p:nvSpPr>
+          <p:cNvPr id="3" name="Content Placeholder 2">
+            <a:extLst>
+              <a:ext uri="{FF2B5EF4-FFF2-40B4-BE49-F238E27FC236}">
+                <a16:creationId xmlns:a16="http://schemas.microsoft.com/office/drawing/2014/main" id="{F23B04C2-FDA2-46BA-BB36-6F4198252183}"/>
+              </a:ext>
+            </a:extLst>
+          </p:cNvPr>
+          <p:cNvSpPr>
+            <a:spLocks noGrp="1"/>
+          </p:cNvSpPr>
+          <p:nvPr>
+            <p:ph idx="1"/>
+          </p:nvPr>
+        </p:nvSpPr>
+        <p:spPr/>
+        <p:txBody>
+          <a:bodyPr/>
+          <a:lstStyle/>
+          <a:p>
+            <a:r>
+              <a:rPr lang="en-US" dirty="0"/>
+              <a:t>Presented by Brian Bauer</a:t>
+            </a:r>
+          </a:p>
+        </p:txBody>
+      </p:sp>
+    </p:spTree>
+    <p:extLst>
+      <p:ext uri="{BB962C8B-B14F-4D97-AF65-F5344CB8AC3E}">
+        <p14:creationId xmlns:p14="http://schemas.microsoft.com/office/powerpoint/2010/main" val="4064571591"/>
+      </p:ext>
+    </p:extLst>
+  </p:cSld>
+  <p:clrMapOvr>
+    <a:masterClrMapping/>
+  </p:clrMapOvr>
+</p:sld>
+</file>
+
+<file path=ppt/slides/slide7.xml><?xml version="1.0" encoding="utf-8"?>
+<p:sld xmlns:a="http://schemas.openxmlformats.org/drawingml/2006/main" xmlns:r="http://schemas.openxmlformats.org/officeDocument/2006/relationships" xmlns:p="http://schemas.openxmlformats.org/presentationml/2006/main">
+  <p:cSld>
+    <p:spTree>
+      <p:nvGrpSpPr>
+        <p:cNvPr id="1" name=""/>
+        <p:cNvGrpSpPr/>
+        <p:nvPr/>
+      </p:nvGrpSpPr>
+      <p:grpSpPr>
+        <a:xfrm>
+          <a:off x="0" y="0"/>
+          <a:ext cx="0" cy="0"/>
+          <a:chOff x="0" y="0"/>
+          <a:chExt cx="0" cy="0"/>
+        </a:xfrm>
+      </p:grpSpPr>
+      <p:sp>
+        <p:nvSpPr>
+          <p:cNvPr id="2" name="Title 1">
+            <a:extLst>
+              <a:ext uri="{FF2B5EF4-FFF2-40B4-BE49-F238E27FC236}">
+                <a16:creationId xmlns:a16="http://schemas.microsoft.com/office/drawing/2014/main" id="{F056D9A3-CD65-4467-85AD-5DF093AEA280}"/>
+              </a:ext>
+            </a:extLst>
+          </p:cNvPr>
+          <p:cNvSpPr>
+            <a:spLocks noGrp="1"/>
+          </p:cNvSpPr>
+          <p:nvPr>
+            <p:ph type="title"/>
+          </p:nvPr>
+        </p:nvSpPr>
+        <p:spPr/>
+        <p:txBody>
+          <a:bodyPr/>
+          <a:lstStyle/>
+          <a:p>
+            <a:r>
+              <a:rPr lang="en-US" dirty="0"/>
+              <a:t>Graphics and Visual Modeling</a:t>
+            </a:r>
+          </a:p>
+        </p:txBody>
+      </p:sp>
+      <p:sp>
+        <p:nvSpPr>
+          <p:cNvPr id="3" name="Content Placeholder 2">
+            <a:extLst>
+              <a:ext uri="{FF2B5EF4-FFF2-40B4-BE49-F238E27FC236}">
+                <a16:creationId xmlns:a16="http://schemas.microsoft.com/office/drawing/2014/main" id="{D00F8DF1-D999-4029-8302-EF8F881F0CE7}"/>
+              </a:ext>
+            </a:extLst>
+          </p:cNvPr>
+          <p:cNvSpPr>
+            <a:spLocks noGrp="1"/>
+          </p:cNvSpPr>
+          <p:nvPr>
+            <p:ph idx="1"/>
+          </p:nvPr>
+        </p:nvSpPr>
+        <p:spPr/>
+        <p:txBody>
+          <a:bodyPr/>
+          <a:lstStyle/>
+          <a:p>
+            <a:r>
+              <a:rPr lang="en-US" dirty="0"/>
+              <a:t>Presented by David </a:t>
+            </a:r>
+            <a:r>
+              <a:rPr lang="en-US" dirty="0" err="1"/>
+              <a:t>Kalbfleisch</a:t>
+            </a:r>
+            <a:endParaRPr lang="en-US" dirty="0"/>
+          </a:p>
+        </p:txBody>
+      </p:sp>
+    </p:spTree>
+    <p:extLst>
+      <p:ext uri="{BB962C8B-B14F-4D97-AF65-F5344CB8AC3E}">
+        <p14:creationId xmlns:p14="http://schemas.microsoft.com/office/powerpoint/2010/main" val="2958682530"/>
+      </p:ext>
+    </p:extLst>
+  </p:cSld>
+  <p:clrMapOvr>
+    <a:masterClrMapping/>
+  </p:clrMapOvr>
+</p:sld>
+</file>
+
+<file path=ppt/slides/slide8.xml><?xml version="1.0" encoding="utf-8"?>
+<p:sld xmlns:a="http://schemas.openxmlformats.org/drawingml/2006/main" xmlns:r="http://schemas.openxmlformats.org/officeDocument/2006/relationships" xmlns:p="http://schemas.openxmlformats.org/presentationml/2006/main">
+  <p:cSld>
+    <p:spTree>
+      <p:nvGrpSpPr>
+        <p:cNvPr id="1" name=""/>
+        <p:cNvGrpSpPr/>
+        <p:nvPr/>
+      </p:nvGrpSpPr>
+      <p:grpSpPr>
+        <a:xfrm>
+          <a:off x="0" y="0"/>
+          <a:ext cx="0" cy="0"/>
+          <a:chOff x="0" y="0"/>
+          <a:chExt cx="0" cy="0"/>
+        </a:xfrm>
+      </p:grpSpPr>
+      <p:sp>
+        <p:nvSpPr>
+          <p:cNvPr id="2" name="Title 1">
+            <a:extLst>
+              <a:ext uri="{FF2B5EF4-FFF2-40B4-BE49-F238E27FC236}">
+                <a16:creationId xmlns:a16="http://schemas.microsoft.com/office/drawing/2014/main" id="{CC7E67D0-9E63-4B6D-B9FD-7C06AE2549D3}"/>
+              </a:ext>
+            </a:extLst>
+          </p:cNvPr>
+          <p:cNvSpPr>
+            <a:spLocks noGrp="1"/>
+          </p:cNvSpPr>
+          <p:nvPr>
+            <p:ph type="title"/>
+          </p:nvPr>
+        </p:nvSpPr>
+        <p:spPr/>
+        <p:txBody>
+          <a:bodyPr/>
+          <a:lstStyle/>
+          <a:p>
+            <a:r>
+              <a:rPr lang="en-US" dirty="0"/>
+              <a:t>Neural Network Development and Training</a:t>
+            </a:r>
+          </a:p>
+        </p:txBody>
+      </p:sp>
+      <p:sp>
+        <p:nvSpPr>
+          <p:cNvPr id="3" name="Content Placeholder 2">
+            <a:extLst>
+              <a:ext uri="{FF2B5EF4-FFF2-40B4-BE49-F238E27FC236}">
+                <a16:creationId xmlns:a16="http://schemas.microsoft.com/office/drawing/2014/main" id="{B8574E30-43AE-4F08-BB4A-46A7F6FC0A95}"/>
+              </a:ext>
+            </a:extLst>
+          </p:cNvPr>
+          <p:cNvSpPr>
+            <a:spLocks noGrp="1"/>
+          </p:cNvSpPr>
+          <p:nvPr>
+            <p:ph idx="1"/>
+          </p:nvPr>
+        </p:nvSpPr>
+        <p:spPr/>
+        <p:txBody>
+          <a:bodyPr/>
+          <a:lstStyle/>
+          <a:p>
+            <a:r>
+              <a:rPr lang="en-US" dirty="0"/>
+              <a:t>Presented by Iman Ismail</a:t>
+            </a:r>
+          </a:p>
+        </p:txBody>
+      </p:sp>
+    </p:spTree>
+    <p:extLst>
+      <p:ext uri="{BB962C8B-B14F-4D97-AF65-F5344CB8AC3E}">
+        <p14:creationId xmlns:p14="http://schemas.microsoft.com/office/powerpoint/2010/main" val="2380164208"/>
+      </p:ext>
+    </p:extLst>
+  </p:cSld>
+  <p:clrMapOvr>
+    <a:masterClrMapping/>
+  </p:clrMapOvr>
+</p:sld>
+</file>
+
+<file path=ppt/slides/slide9.xml><?xml version="1.0" encoding="utf-8"?>
+<p:sld xmlns:a="http://schemas.openxmlformats.org/drawingml/2006/main" xmlns:r="http://schemas.openxmlformats.org/officeDocument/2006/relationships" xmlns:p="http://schemas.openxmlformats.org/presentationml/2006/main">
+  <p:cSld>
+    <p:spTree>
+      <p:nvGrpSpPr>
+        <p:cNvPr id="1" name=""/>
+        <p:cNvGrpSpPr/>
+        <p:nvPr/>
+      </p:nvGrpSpPr>
+      <p:grpSpPr>
+        <a:xfrm>
+          <a:off x="0" y="0"/>
+          <a:ext cx="0" cy="0"/>
+          <a:chOff x="0" y="0"/>
+          <a:chExt cx="0" cy="0"/>
+        </a:xfrm>
+      </p:grpSpPr>
+      <p:sp>
+        <p:nvSpPr>
+          <p:cNvPr id="2" name="Title 1">
+            <a:extLst>
+              <a:ext uri="{FF2B5EF4-FFF2-40B4-BE49-F238E27FC236}">
+                <a16:creationId xmlns:a16="http://schemas.microsoft.com/office/drawing/2014/main" id="{1A1B75CE-271D-48FB-82BD-3BADE505A17C}"/>
+              </a:ext>
+            </a:extLst>
+          </p:cNvPr>
+          <p:cNvSpPr>
+            <a:spLocks noGrp="1"/>
+          </p:cNvSpPr>
+          <p:nvPr>
+            <p:ph type="title"/>
+          </p:nvPr>
+        </p:nvSpPr>
+        <p:spPr/>
+        <p:txBody>
+          <a:bodyPr/>
+          <a:lstStyle/>
+          <a:p>
+            <a:r>
+              <a:rPr lang="en-US" dirty="0"/>
+              <a:t>Conclusion and Final Remarks</a:t>
+            </a:r>
+          </a:p>
+        </p:txBody>
+      </p:sp>
+      <p:sp>
+        <p:nvSpPr>
+          <p:cNvPr id="3" name="Content Placeholder 2">
+            <a:extLst>
+              <a:ext uri="{FF2B5EF4-FFF2-40B4-BE49-F238E27FC236}">
+                <a16:creationId xmlns:a16="http://schemas.microsoft.com/office/drawing/2014/main" id="{66D0B58D-CDE0-4DEF-9CDF-DF1D09AAB349}"/>
+              </a:ext>
+            </a:extLst>
+          </p:cNvPr>
+          <p:cNvSpPr>
+            <a:spLocks noGrp="1"/>
+          </p:cNvSpPr>
+          <p:nvPr>
+            <p:ph idx="1"/>
+          </p:nvPr>
+        </p:nvSpPr>
+        <p:spPr/>
+        <p:txBody>
+          <a:bodyPr/>
+          <a:lstStyle/>
+          <a:p>
+            <a:r>
+              <a:rPr lang="en-US" dirty="0"/>
+              <a:t>Demo </a:t>
+            </a:r>
+            <a:r>
+              <a:rPr lang="en-US"/>
+              <a:t>to follow</a:t>
+            </a:r>
+          </a:p>
+        </p:txBody>
+      </p:sp>
+    </p:spTree>
+    <p:extLst>
+      <p:ext uri="{BB962C8B-B14F-4D97-AF65-F5344CB8AC3E}">
+        <p14:creationId xmlns:p14="http://schemas.microsoft.com/office/powerpoint/2010/main" val="2558569331"/>
+      </p:ext>
+    </p:extLst>
+  </p:cSld>
+  <p:clrMapOvr>
+    <a:masterClrMapping/>
+  </p:clrMapOvr>
+</p:sld>
+</file>
+
 <file path=ppt/theme/theme1.xml><?xml version="1.0" encoding="utf-8"?>
 <a:theme xmlns:a="http://schemas.openxmlformats.org/drawingml/2006/main" name="Office Theme">
   <a:themeElements>

</xml_diff>

<commit_message>
reorganize and start to add content
</commit_message>
<xml_diff>
--- a/Final-Presentation.pptx
+++ b/Final-Presentation.pptx
@@ -4,16 +4,21 @@
   <p:sldMasterIdLst>
     <p:sldMasterId id="2147483648" r:id="rId1"/>
   </p:sldMasterIdLst>
+  <p:notesMasterIdLst>
+    <p:notesMasterId r:id="rId13"/>
+  </p:notesMasterIdLst>
   <p:sldIdLst>
     <p:sldId id="256" r:id="rId2"/>
     <p:sldId id="257" r:id="rId3"/>
     <p:sldId id="258" r:id="rId4"/>
     <p:sldId id="259" r:id="rId5"/>
     <p:sldId id="260" r:id="rId6"/>
-    <p:sldId id="261" r:id="rId7"/>
+    <p:sldId id="265" r:id="rId7"/>
     <p:sldId id="262" r:id="rId8"/>
     <p:sldId id="263" r:id="rId9"/>
-    <p:sldId id="264" r:id="rId10"/>
+    <p:sldId id="261" r:id="rId10"/>
+    <p:sldId id="266" r:id="rId11"/>
+    <p:sldId id="264" r:id="rId12"/>
   </p:sldIdLst>
   <p:sldSz cx="12192000" cy="6858000"/>
   <p:notesSz cx="6858000" cy="9144000"/>
@@ -112,7 +117,540 @@
       </a:defRPr>
     </a:lvl9pPr>
   </p:defaultTextStyle>
+  <p:extLst>
+    <p:ext uri="{EFAFB233-063F-42B5-8137-9DF3F51BA10A}">
+      <p15:sldGuideLst xmlns:p15="http://schemas.microsoft.com/office/powerpoint/2012/main"/>
+    </p:ext>
+  </p:extLst>
 </p:presentation>
+</file>
+
+<file path=ppt/notesMasters/notesMaster1.xml><?xml version="1.0" encoding="utf-8"?>
+<p:notesMaster xmlns:a="http://schemas.openxmlformats.org/drawingml/2006/main" xmlns:r="http://schemas.openxmlformats.org/officeDocument/2006/relationships" xmlns:p="http://schemas.openxmlformats.org/presentationml/2006/main">
+  <p:cSld>
+    <p:bg>
+      <p:bgRef idx="1001">
+        <a:schemeClr val="bg1"/>
+      </p:bgRef>
+    </p:bg>
+    <p:spTree>
+      <p:nvGrpSpPr>
+        <p:cNvPr id="1" name=""/>
+        <p:cNvGrpSpPr/>
+        <p:nvPr/>
+      </p:nvGrpSpPr>
+      <p:grpSpPr>
+        <a:xfrm>
+          <a:off x="0" y="0"/>
+          <a:ext cx="0" cy="0"/>
+          <a:chOff x="0" y="0"/>
+          <a:chExt cx="0" cy="0"/>
+        </a:xfrm>
+      </p:grpSpPr>
+      <p:sp>
+        <p:nvSpPr>
+          <p:cNvPr id="2" name="Header Placeholder 1"/>
+          <p:cNvSpPr>
+            <a:spLocks noGrp="1"/>
+          </p:cNvSpPr>
+          <p:nvPr>
+            <p:ph type="hdr" sz="quarter"/>
+          </p:nvPr>
+        </p:nvSpPr>
+        <p:spPr>
+          <a:xfrm>
+            <a:off x="0" y="0"/>
+            <a:ext cx="2971800" cy="458788"/>
+          </a:xfrm>
+          <a:prstGeom prst="rect">
+            <a:avLst/>
+          </a:prstGeom>
+        </p:spPr>
+        <p:txBody>
+          <a:bodyPr vert="horz" lIns="91440" tIns="45720" rIns="91440" bIns="45720" rtlCol="0"/>
+          <a:lstStyle>
+            <a:lvl1pPr algn="l">
+              <a:defRPr sz="1200"/>
+            </a:lvl1pPr>
+          </a:lstStyle>
+          <a:p>
+            <a:endParaRPr lang="en-US"/>
+          </a:p>
+        </p:txBody>
+      </p:sp>
+      <p:sp>
+        <p:nvSpPr>
+          <p:cNvPr id="3" name="Date Placeholder 2"/>
+          <p:cNvSpPr>
+            <a:spLocks noGrp="1"/>
+          </p:cNvSpPr>
+          <p:nvPr>
+            <p:ph type="dt" idx="1"/>
+          </p:nvPr>
+        </p:nvSpPr>
+        <p:spPr>
+          <a:xfrm>
+            <a:off x="3884613" y="0"/>
+            <a:ext cx="2971800" cy="458788"/>
+          </a:xfrm>
+          <a:prstGeom prst="rect">
+            <a:avLst/>
+          </a:prstGeom>
+        </p:spPr>
+        <p:txBody>
+          <a:bodyPr vert="horz" lIns="91440" tIns="45720" rIns="91440" bIns="45720" rtlCol="0"/>
+          <a:lstStyle>
+            <a:lvl1pPr algn="r">
+              <a:defRPr sz="1200"/>
+            </a:lvl1pPr>
+          </a:lstStyle>
+          <a:p>
+            <a:fld id="{D4AF793E-324A-4EE1-8CCE-F34286378BCB}" type="datetimeFigureOut">
+              <a:rPr lang="en-US" smtClean="0"/>
+              <a:t>5/9/2021</a:t>
+            </a:fld>
+            <a:endParaRPr lang="en-US"/>
+          </a:p>
+        </p:txBody>
+      </p:sp>
+      <p:sp>
+        <p:nvSpPr>
+          <p:cNvPr id="4" name="Slide Image Placeholder 3"/>
+          <p:cNvSpPr>
+            <a:spLocks noGrp="1" noRot="1" noChangeAspect="1"/>
+          </p:cNvSpPr>
+          <p:nvPr>
+            <p:ph type="sldImg" idx="2"/>
+          </p:nvPr>
+        </p:nvSpPr>
+        <p:spPr>
+          <a:xfrm>
+            <a:off x="685800" y="1143000"/>
+            <a:ext cx="5486400" cy="3086100"/>
+          </a:xfrm>
+          <a:prstGeom prst="rect">
+            <a:avLst/>
+          </a:prstGeom>
+          <a:noFill/>
+          <a:ln w="12700">
+            <a:solidFill>
+              <a:prstClr val="black"/>
+            </a:solidFill>
+          </a:ln>
+        </p:spPr>
+        <p:txBody>
+          <a:bodyPr vert="horz" lIns="91440" tIns="45720" rIns="91440" bIns="45720" rtlCol="0" anchor="ctr"/>
+          <a:lstStyle/>
+          <a:p>
+            <a:endParaRPr lang="en-US"/>
+          </a:p>
+        </p:txBody>
+      </p:sp>
+      <p:sp>
+        <p:nvSpPr>
+          <p:cNvPr id="5" name="Notes Placeholder 4"/>
+          <p:cNvSpPr>
+            <a:spLocks noGrp="1"/>
+          </p:cNvSpPr>
+          <p:nvPr>
+            <p:ph type="body" sz="quarter" idx="3"/>
+          </p:nvPr>
+        </p:nvSpPr>
+        <p:spPr>
+          <a:xfrm>
+            <a:off x="685800" y="4400550"/>
+            <a:ext cx="5486400" cy="3600450"/>
+          </a:xfrm>
+          <a:prstGeom prst="rect">
+            <a:avLst/>
+          </a:prstGeom>
+        </p:spPr>
+        <p:txBody>
+          <a:bodyPr vert="horz" lIns="91440" tIns="45720" rIns="91440" bIns="45720" rtlCol="0"/>
+          <a:lstStyle/>
+          <a:p>
+            <a:pPr lvl="0"/>
+            <a:r>
+              <a:rPr lang="en-US"/>
+              <a:t>Click to edit Master text styles</a:t>
+            </a:r>
+          </a:p>
+          <a:p>
+            <a:pPr lvl="1"/>
+            <a:r>
+              <a:rPr lang="en-US"/>
+              <a:t>Second level</a:t>
+            </a:r>
+          </a:p>
+          <a:p>
+            <a:pPr lvl="2"/>
+            <a:r>
+              <a:rPr lang="en-US"/>
+              <a:t>Third level</a:t>
+            </a:r>
+          </a:p>
+          <a:p>
+            <a:pPr lvl="3"/>
+            <a:r>
+              <a:rPr lang="en-US"/>
+              <a:t>Fourth level</a:t>
+            </a:r>
+          </a:p>
+          <a:p>
+            <a:pPr lvl="4"/>
+            <a:r>
+              <a:rPr lang="en-US"/>
+              <a:t>Fifth level</a:t>
+            </a:r>
+          </a:p>
+        </p:txBody>
+      </p:sp>
+      <p:sp>
+        <p:nvSpPr>
+          <p:cNvPr id="6" name="Footer Placeholder 5"/>
+          <p:cNvSpPr>
+            <a:spLocks noGrp="1"/>
+          </p:cNvSpPr>
+          <p:nvPr>
+            <p:ph type="ftr" sz="quarter" idx="4"/>
+          </p:nvPr>
+        </p:nvSpPr>
+        <p:spPr>
+          <a:xfrm>
+            <a:off x="0" y="8685213"/>
+            <a:ext cx="2971800" cy="458787"/>
+          </a:xfrm>
+          <a:prstGeom prst="rect">
+            <a:avLst/>
+          </a:prstGeom>
+        </p:spPr>
+        <p:txBody>
+          <a:bodyPr vert="horz" lIns="91440" tIns="45720" rIns="91440" bIns="45720" rtlCol="0" anchor="b"/>
+          <a:lstStyle>
+            <a:lvl1pPr algn="l">
+              <a:defRPr sz="1200"/>
+            </a:lvl1pPr>
+          </a:lstStyle>
+          <a:p>
+            <a:endParaRPr lang="en-US"/>
+          </a:p>
+        </p:txBody>
+      </p:sp>
+      <p:sp>
+        <p:nvSpPr>
+          <p:cNvPr id="7" name="Slide Number Placeholder 6"/>
+          <p:cNvSpPr>
+            <a:spLocks noGrp="1"/>
+          </p:cNvSpPr>
+          <p:nvPr>
+            <p:ph type="sldNum" sz="quarter" idx="5"/>
+          </p:nvPr>
+        </p:nvSpPr>
+        <p:spPr>
+          <a:xfrm>
+            <a:off x="3884613" y="8685213"/>
+            <a:ext cx="2971800" cy="458787"/>
+          </a:xfrm>
+          <a:prstGeom prst="rect">
+            <a:avLst/>
+          </a:prstGeom>
+        </p:spPr>
+        <p:txBody>
+          <a:bodyPr vert="horz" lIns="91440" tIns="45720" rIns="91440" bIns="45720" rtlCol="0" anchor="b"/>
+          <a:lstStyle>
+            <a:lvl1pPr algn="r">
+              <a:defRPr sz="1200"/>
+            </a:lvl1pPr>
+          </a:lstStyle>
+          <a:p>
+            <a:fld id="{41E1D21A-986E-4A40-A239-C10C67A7E9EA}" type="slidenum">
+              <a:rPr lang="en-US" smtClean="0"/>
+              <a:t>‹#›</a:t>
+            </a:fld>
+            <a:endParaRPr lang="en-US"/>
+          </a:p>
+        </p:txBody>
+      </p:sp>
+    </p:spTree>
+    <p:extLst>
+      <p:ext uri="{BB962C8B-B14F-4D97-AF65-F5344CB8AC3E}">
+        <p14:creationId xmlns:p14="http://schemas.microsoft.com/office/powerpoint/2010/main" val="1382672472"/>
+      </p:ext>
+    </p:extLst>
+  </p:cSld>
+  <p:clrMap bg1="lt1" tx1="dk1" bg2="lt2" tx2="dk2" accent1="accent1" accent2="accent2" accent3="accent3" accent4="accent4" accent5="accent5" accent6="accent6" hlink="hlink" folHlink="folHlink"/>
+  <p:notesStyle>
+    <a:lvl1pPr marL="0" algn="l" defTabSz="914400" rtl="0" eaLnBrk="1" latinLnBrk="0" hangingPunct="1">
+      <a:defRPr sz="1200" kern="1200">
+        <a:solidFill>
+          <a:schemeClr val="tx1"/>
+        </a:solidFill>
+        <a:latin typeface="+mn-lt"/>
+        <a:ea typeface="+mn-ea"/>
+        <a:cs typeface="+mn-cs"/>
+      </a:defRPr>
+    </a:lvl1pPr>
+    <a:lvl2pPr marL="457200" algn="l" defTabSz="914400" rtl="0" eaLnBrk="1" latinLnBrk="0" hangingPunct="1">
+      <a:defRPr sz="1200" kern="1200">
+        <a:solidFill>
+          <a:schemeClr val="tx1"/>
+        </a:solidFill>
+        <a:latin typeface="+mn-lt"/>
+        <a:ea typeface="+mn-ea"/>
+        <a:cs typeface="+mn-cs"/>
+      </a:defRPr>
+    </a:lvl2pPr>
+    <a:lvl3pPr marL="914400" algn="l" defTabSz="914400" rtl="0" eaLnBrk="1" latinLnBrk="0" hangingPunct="1">
+      <a:defRPr sz="1200" kern="1200">
+        <a:solidFill>
+          <a:schemeClr val="tx1"/>
+        </a:solidFill>
+        <a:latin typeface="+mn-lt"/>
+        <a:ea typeface="+mn-ea"/>
+        <a:cs typeface="+mn-cs"/>
+      </a:defRPr>
+    </a:lvl3pPr>
+    <a:lvl4pPr marL="1371600" algn="l" defTabSz="914400" rtl="0" eaLnBrk="1" latinLnBrk="0" hangingPunct="1">
+      <a:defRPr sz="1200" kern="1200">
+        <a:solidFill>
+          <a:schemeClr val="tx1"/>
+        </a:solidFill>
+        <a:latin typeface="+mn-lt"/>
+        <a:ea typeface="+mn-ea"/>
+        <a:cs typeface="+mn-cs"/>
+      </a:defRPr>
+    </a:lvl4pPr>
+    <a:lvl5pPr marL="1828800" algn="l" defTabSz="914400" rtl="0" eaLnBrk="1" latinLnBrk="0" hangingPunct="1">
+      <a:defRPr sz="1200" kern="1200">
+        <a:solidFill>
+          <a:schemeClr val="tx1"/>
+        </a:solidFill>
+        <a:latin typeface="+mn-lt"/>
+        <a:ea typeface="+mn-ea"/>
+        <a:cs typeface="+mn-cs"/>
+      </a:defRPr>
+    </a:lvl5pPr>
+    <a:lvl6pPr marL="2286000" algn="l" defTabSz="914400" rtl="0" eaLnBrk="1" latinLnBrk="0" hangingPunct="1">
+      <a:defRPr sz="1200" kern="1200">
+        <a:solidFill>
+          <a:schemeClr val="tx1"/>
+        </a:solidFill>
+        <a:latin typeface="+mn-lt"/>
+        <a:ea typeface="+mn-ea"/>
+        <a:cs typeface="+mn-cs"/>
+      </a:defRPr>
+    </a:lvl6pPr>
+    <a:lvl7pPr marL="2743200" algn="l" defTabSz="914400" rtl="0" eaLnBrk="1" latinLnBrk="0" hangingPunct="1">
+      <a:defRPr sz="1200" kern="1200">
+        <a:solidFill>
+          <a:schemeClr val="tx1"/>
+        </a:solidFill>
+        <a:latin typeface="+mn-lt"/>
+        <a:ea typeface="+mn-ea"/>
+        <a:cs typeface="+mn-cs"/>
+      </a:defRPr>
+    </a:lvl7pPr>
+    <a:lvl8pPr marL="3200400" algn="l" defTabSz="914400" rtl="0" eaLnBrk="1" latinLnBrk="0" hangingPunct="1">
+      <a:defRPr sz="1200" kern="1200">
+        <a:solidFill>
+          <a:schemeClr val="tx1"/>
+        </a:solidFill>
+        <a:latin typeface="+mn-lt"/>
+        <a:ea typeface="+mn-ea"/>
+        <a:cs typeface="+mn-cs"/>
+      </a:defRPr>
+    </a:lvl8pPr>
+    <a:lvl9pPr marL="3657600" algn="l" defTabSz="914400" rtl="0" eaLnBrk="1" latinLnBrk="0" hangingPunct="1">
+      <a:defRPr sz="1200" kern="1200">
+        <a:solidFill>
+          <a:schemeClr val="tx1"/>
+        </a:solidFill>
+        <a:latin typeface="+mn-lt"/>
+        <a:ea typeface="+mn-ea"/>
+        <a:cs typeface="+mn-cs"/>
+      </a:defRPr>
+    </a:lvl9pPr>
+  </p:notesStyle>
+</p:notesMaster>
+</file>
+
+<file path=ppt/notesSlides/notesSlide1.xml><?xml version="1.0" encoding="utf-8"?>
+<p:notes xmlns:a="http://schemas.openxmlformats.org/drawingml/2006/main" xmlns:r="http://schemas.openxmlformats.org/officeDocument/2006/relationships" xmlns:p="http://schemas.openxmlformats.org/presentationml/2006/main">
+  <p:cSld>
+    <p:spTree>
+      <p:nvGrpSpPr>
+        <p:cNvPr id="1" name=""/>
+        <p:cNvGrpSpPr/>
+        <p:nvPr/>
+      </p:nvGrpSpPr>
+      <p:grpSpPr>
+        <a:xfrm>
+          <a:off x="0" y="0"/>
+          <a:ext cx="0" cy="0"/>
+          <a:chOff x="0" y="0"/>
+          <a:chExt cx="0" cy="0"/>
+        </a:xfrm>
+      </p:grpSpPr>
+      <p:sp>
+        <p:nvSpPr>
+          <p:cNvPr id="2" name="Slide Image Placeholder 1"/>
+          <p:cNvSpPr>
+            <a:spLocks noGrp="1" noRot="1" noChangeAspect="1"/>
+          </p:cNvSpPr>
+          <p:nvPr>
+            <p:ph type="sldImg"/>
+          </p:nvPr>
+        </p:nvSpPr>
+        <p:spPr/>
+      </p:sp>
+      <p:sp>
+        <p:nvSpPr>
+          <p:cNvPr id="3" name="Notes Placeholder 2"/>
+          <p:cNvSpPr>
+            <a:spLocks noGrp="1"/>
+          </p:cNvSpPr>
+          <p:nvPr>
+            <p:ph type="body" idx="1"/>
+          </p:nvPr>
+        </p:nvSpPr>
+        <p:spPr/>
+        <p:txBody>
+          <a:bodyPr/>
+          <a:lstStyle/>
+          <a:p>
+            <a:pPr marL="171450" marR="0" lvl="0" indent="-171450" algn="l" defTabSz="914400" rtl="0" eaLnBrk="1" fontAlgn="auto" latinLnBrk="0" hangingPunct="1">
+              <a:lnSpc>
+                <a:spcPct val="100000"/>
+              </a:lnSpc>
+              <a:spcBef>
+                <a:spcPts val="0"/>
+              </a:spcBef>
+              <a:spcAft>
+                <a:spcPts val="0"/>
+              </a:spcAft>
+              <a:buClrTx/>
+              <a:buSzTx/>
+              <a:buFont typeface="Arial" panose="020B0604020202020204" pitchFamily="34" charset="0"/>
+              <a:buChar char="•"/>
+              <a:tabLst/>
+              <a:defRPr/>
+            </a:pPr>
+            <a:r>
+              <a:rPr lang="en-US" dirty="0"/>
+              <a:t>This is all created by executing a single command</a:t>
+            </a:r>
+          </a:p>
+          <a:p>
+            <a:pPr marL="171450" indent="-171450">
+              <a:buFont typeface="Arial" panose="020B0604020202020204" pitchFamily="34" charset="0"/>
+              <a:buChar char="•"/>
+            </a:pPr>
+            <a:r>
+              <a:rPr lang="en-US" dirty="0"/>
+              <a:t>All of this runs on one computer, but it is designed such that each blue box can become a physical cart.</a:t>
+            </a:r>
+          </a:p>
+          <a:p>
+            <a:pPr marL="171450" indent="-171450">
+              <a:buFont typeface="Arial" panose="020B0604020202020204" pitchFamily="34" charset="0"/>
+              <a:buChar char="•"/>
+            </a:pPr>
+            <a:r>
+              <a:rPr lang="en-US" dirty="0"/>
+              <a:t>Each python program (called bumper_car_controller.py) loads its own copy of the trained model used for classification</a:t>
+            </a:r>
+          </a:p>
+          <a:p>
+            <a:pPr marL="171450" indent="-171450">
+              <a:buFont typeface="Arial" panose="020B0604020202020204" pitchFamily="34" charset="0"/>
+              <a:buChar char="•"/>
+            </a:pPr>
+            <a:r>
+              <a:rPr lang="en-US" dirty="0"/>
+              <a:t>Each instance of bumper_car_controller.py makes decisions independently and only for the cart that it is attached to.</a:t>
+            </a:r>
+          </a:p>
+          <a:p>
+            <a:pPr marL="628650" lvl="1" indent="-171450">
+              <a:buFont typeface="Arial" panose="020B0604020202020204" pitchFamily="34" charset="0"/>
+              <a:buChar char="•"/>
+            </a:pPr>
+            <a:r>
+              <a:rPr lang="en-US" dirty="0"/>
+              <a:t>This allows us to extend the functionality in the future</a:t>
+            </a:r>
+          </a:p>
+          <a:p>
+            <a:pPr marL="1085850" lvl="2" indent="-171450">
+              <a:buFont typeface="Arial" panose="020B0604020202020204" pitchFamily="34" charset="0"/>
+              <a:buChar char="•"/>
+            </a:pPr>
+            <a:r>
+              <a:rPr lang="en-US" dirty="0"/>
+              <a:t>Each cart can be instructed to load a different model</a:t>
+            </a:r>
+          </a:p>
+          <a:p>
+            <a:pPr marL="1085850" lvl="2" indent="-171450">
+              <a:buFont typeface="Arial" panose="020B0604020202020204" pitchFamily="34" charset="0"/>
+              <a:buChar char="•"/>
+            </a:pPr>
+            <a:r>
+              <a:rPr lang="en-US" dirty="0"/>
+              <a:t>Each cart can be instructed to run a different decision-making algorithm</a:t>
+            </a:r>
+          </a:p>
+          <a:p>
+            <a:pPr marL="628650" lvl="1" indent="-171450">
+              <a:buFont typeface="Arial" panose="020B0604020202020204" pitchFamily="34" charset="0"/>
+              <a:buChar char="•"/>
+            </a:pPr>
+            <a:r>
+              <a:rPr lang="en-US" dirty="0"/>
+              <a:t>We can test different options by running them against </a:t>
+            </a:r>
+            <a:r>
+              <a:rPr lang="en-US"/>
+              <a:t>each other</a:t>
+            </a:r>
+            <a:endParaRPr lang="en-US" dirty="0"/>
+          </a:p>
+        </p:txBody>
+      </p:sp>
+      <p:sp>
+        <p:nvSpPr>
+          <p:cNvPr id="4" name="Slide Number Placeholder 3"/>
+          <p:cNvSpPr>
+            <a:spLocks noGrp="1"/>
+          </p:cNvSpPr>
+          <p:nvPr>
+            <p:ph type="sldNum" sz="quarter" idx="5"/>
+          </p:nvPr>
+        </p:nvSpPr>
+        <p:spPr/>
+        <p:txBody>
+          <a:bodyPr/>
+          <a:lstStyle/>
+          <a:p>
+            <a:fld id="{41E1D21A-986E-4A40-A239-C10C67A7E9EA}" type="slidenum">
+              <a:rPr lang="en-US" smtClean="0"/>
+              <a:t>10</a:t>
+            </a:fld>
+            <a:endParaRPr lang="en-US"/>
+          </a:p>
+        </p:txBody>
+      </p:sp>
+    </p:spTree>
+    <p:extLst>
+      <p:ext uri="{BB962C8B-B14F-4D97-AF65-F5344CB8AC3E}">
+        <p14:creationId xmlns:p14="http://schemas.microsoft.com/office/powerpoint/2010/main" val="168854221"/>
+      </p:ext>
+    </p:extLst>
+  </p:cSld>
+  <p:clrMapOvr>
+    <a:masterClrMapping/>
+  </p:clrMapOvr>
+</p:notes>
 </file>
 
 <file path=ppt/slideLayouts/slideLayout1.xml><?xml version="1.0" encoding="utf-8"?>
@@ -262,7 +800,7 @@
           <a:p>
             <a:fld id="{26A7EA1D-83B1-4829-AF6E-ECA8838C8D64}" type="datetimeFigureOut">
               <a:rPr lang="en-US" smtClean="0"/>
-              <a:t>5/6/2021</a:t>
+              <a:t>5/9/2021</a:t>
             </a:fld>
             <a:endParaRPr lang="en-US"/>
           </a:p>
@@ -460,7 +998,7 @@
           <a:p>
             <a:fld id="{26A7EA1D-83B1-4829-AF6E-ECA8838C8D64}" type="datetimeFigureOut">
               <a:rPr lang="en-US" smtClean="0"/>
-              <a:t>5/6/2021</a:t>
+              <a:t>5/9/2021</a:t>
             </a:fld>
             <a:endParaRPr lang="en-US"/>
           </a:p>
@@ -668,7 +1206,7 @@
           <a:p>
             <a:fld id="{26A7EA1D-83B1-4829-AF6E-ECA8838C8D64}" type="datetimeFigureOut">
               <a:rPr lang="en-US" smtClean="0"/>
-              <a:t>5/6/2021</a:t>
+              <a:t>5/9/2021</a:t>
             </a:fld>
             <a:endParaRPr lang="en-US"/>
           </a:p>
@@ -866,7 +1404,7 @@
           <a:p>
             <a:fld id="{26A7EA1D-83B1-4829-AF6E-ECA8838C8D64}" type="datetimeFigureOut">
               <a:rPr lang="en-US" smtClean="0"/>
-              <a:t>5/6/2021</a:t>
+              <a:t>5/9/2021</a:t>
             </a:fld>
             <a:endParaRPr lang="en-US"/>
           </a:p>
@@ -1141,7 +1679,7 @@
           <a:p>
             <a:fld id="{26A7EA1D-83B1-4829-AF6E-ECA8838C8D64}" type="datetimeFigureOut">
               <a:rPr lang="en-US" smtClean="0"/>
-              <a:t>5/6/2021</a:t>
+              <a:t>5/9/2021</a:t>
             </a:fld>
             <a:endParaRPr lang="en-US"/>
           </a:p>
@@ -1406,7 +1944,7 @@
           <a:p>
             <a:fld id="{26A7EA1D-83B1-4829-AF6E-ECA8838C8D64}" type="datetimeFigureOut">
               <a:rPr lang="en-US" smtClean="0"/>
-              <a:t>5/6/2021</a:t>
+              <a:t>5/9/2021</a:t>
             </a:fld>
             <a:endParaRPr lang="en-US"/>
           </a:p>
@@ -1818,7 +2356,7 @@
           <a:p>
             <a:fld id="{26A7EA1D-83B1-4829-AF6E-ECA8838C8D64}" type="datetimeFigureOut">
               <a:rPr lang="en-US" smtClean="0"/>
-              <a:t>5/6/2021</a:t>
+              <a:t>5/9/2021</a:t>
             </a:fld>
             <a:endParaRPr lang="en-US"/>
           </a:p>
@@ -1959,7 +2497,7 @@
           <a:p>
             <a:fld id="{26A7EA1D-83B1-4829-AF6E-ECA8838C8D64}" type="datetimeFigureOut">
               <a:rPr lang="en-US" smtClean="0"/>
-              <a:t>5/6/2021</a:t>
+              <a:t>5/9/2021</a:t>
             </a:fld>
             <a:endParaRPr lang="en-US"/>
           </a:p>
@@ -2072,7 +2610,7 @@
           <a:p>
             <a:fld id="{26A7EA1D-83B1-4829-AF6E-ECA8838C8D64}" type="datetimeFigureOut">
               <a:rPr lang="en-US" smtClean="0"/>
-              <a:t>5/6/2021</a:t>
+              <a:t>5/9/2021</a:t>
             </a:fld>
             <a:endParaRPr lang="en-US"/>
           </a:p>
@@ -2383,7 +2921,7 @@
           <a:p>
             <a:fld id="{26A7EA1D-83B1-4829-AF6E-ECA8838C8D64}" type="datetimeFigureOut">
               <a:rPr lang="en-US" smtClean="0"/>
-              <a:t>5/6/2021</a:t>
+              <a:t>5/9/2021</a:t>
             </a:fld>
             <a:endParaRPr lang="en-US"/>
           </a:p>
@@ -2671,7 +3209,7 @@
           <a:p>
             <a:fld id="{26A7EA1D-83B1-4829-AF6E-ECA8838C8D64}" type="datetimeFigureOut">
               <a:rPr lang="en-US" smtClean="0"/>
-              <a:t>5/6/2021</a:t>
+              <a:t>5/9/2021</a:t>
             </a:fld>
             <a:endParaRPr lang="en-US"/>
           </a:p>
@@ -2912,7 +3450,7 @@
           <a:p>
             <a:fld id="{26A7EA1D-83B1-4829-AF6E-ECA8838C8D64}" type="datetimeFigureOut">
               <a:rPr lang="en-US" smtClean="0"/>
-              <a:t>5/6/2021</a:t>
+              <a:t>5/9/2021</a:t>
             </a:fld>
             <a:endParaRPr lang="en-US"/>
           </a:p>
@@ -3418,6 +3956,185 @@
 </p:sld>
 </file>
 
+<file path=ppt/slides/slide10.xml><?xml version="1.0" encoding="utf-8"?>
+<p:sld xmlns:a="http://schemas.openxmlformats.org/drawingml/2006/main" xmlns:r="http://schemas.openxmlformats.org/officeDocument/2006/relationships" xmlns:p="http://schemas.openxmlformats.org/presentationml/2006/main">
+  <p:cSld>
+    <p:spTree>
+      <p:nvGrpSpPr>
+        <p:cNvPr id="1" name=""/>
+        <p:cNvGrpSpPr/>
+        <p:nvPr/>
+      </p:nvGrpSpPr>
+      <p:grpSpPr>
+        <a:xfrm>
+          <a:off x="0" y="0"/>
+          <a:ext cx="0" cy="0"/>
+          <a:chOff x="0" y="0"/>
+          <a:chExt cx="0" cy="0"/>
+        </a:xfrm>
+      </p:grpSpPr>
+      <p:graphicFrame>
+        <p:nvGraphicFramePr>
+          <p:cNvPr id="2" name="Object 1">
+            <a:extLst>
+              <a:ext uri="{FF2B5EF4-FFF2-40B4-BE49-F238E27FC236}">
+                <a16:creationId xmlns:a16="http://schemas.microsoft.com/office/drawing/2014/main" id="{D77BEFA0-37B1-4A58-BD4F-B69E94950126}"/>
+              </a:ext>
+            </a:extLst>
+          </p:cNvPr>
+          <p:cNvGraphicFramePr>
+            <a:graphicFrameLocks noChangeAspect="1"/>
+          </p:cNvGraphicFramePr>
+          <p:nvPr>
+            <p:extLst>
+              <p:ext uri="{D42A27DB-BD31-4B8C-83A1-F6EECF244321}">
+                <p14:modId xmlns:p14="http://schemas.microsoft.com/office/powerpoint/2010/main" val="4039860574"/>
+              </p:ext>
+            </p:extLst>
+          </p:nvPr>
+        </p:nvGraphicFramePr>
+        <p:xfrm>
+          <a:off x="2175535" y="151286"/>
+          <a:ext cx="7840930" cy="6555427"/>
+        </p:xfrm>
+        <a:graphic>
+          <a:graphicData uri="http://schemas.openxmlformats.org/presentationml/2006/ole">
+            <mc:AlternateContent xmlns:mc="http://schemas.openxmlformats.org/markup-compatibility/2006">
+              <mc:Choice xmlns:v="urn:schemas-microsoft-com:vml" Requires="v">
+                <p:oleObj name="ms-resource:Resources/OleClassShortDisplayName" r:id="rId3" imgW="9334440" imgH="7804080" progId="Paint.Picture.1">
+                  <p:embed/>
+                </p:oleObj>
+              </mc:Choice>
+              <mc:Fallback>
+                <p:oleObj name="ms-resource:Resources/OleClassShortDisplayName" r:id="rId3" imgW="9334440" imgH="7804080" progId="Paint.Picture.1">
+                  <p:embed/>
+                  <p:pic>
+                    <p:nvPicPr>
+                      <p:cNvPr id="0" name=""/>
+                      <p:cNvPicPr/>
+                      <p:nvPr/>
+                    </p:nvPicPr>
+                    <p:blipFill>
+                      <a:blip r:embed="rId4"/>
+                      <a:stretch>
+                        <a:fillRect/>
+                      </a:stretch>
+                    </p:blipFill>
+                    <p:spPr>
+                      <a:xfrm>
+                        <a:off x="2175535" y="151286"/>
+                        <a:ext cx="7840930" cy="6555427"/>
+                      </a:xfrm>
+                      <a:prstGeom prst="rect">
+                        <a:avLst/>
+                      </a:prstGeom>
+                    </p:spPr>
+                  </p:pic>
+                </p:oleObj>
+              </mc:Fallback>
+            </mc:AlternateContent>
+          </a:graphicData>
+        </a:graphic>
+      </p:graphicFrame>
+    </p:spTree>
+    <p:extLst>
+      <p:ext uri="{BB962C8B-B14F-4D97-AF65-F5344CB8AC3E}">
+        <p14:creationId xmlns:p14="http://schemas.microsoft.com/office/powerpoint/2010/main" val="2305694796"/>
+      </p:ext>
+    </p:extLst>
+  </p:cSld>
+  <p:clrMapOvr>
+    <a:masterClrMapping/>
+  </p:clrMapOvr>
+</p:sld>
+</file>
+
+<file path=ppt/slides/slide11.xml><?xml version="1.0" encoding="utf-8"?>
+<p:sld xmlns:a="http://schemas.openxmlformats.org/drawingml/2006/main" xmlns:r="http://schemas.openxmlformats.org/officeDocument/2006/relationships" xmlns:p="http://schemas.openxmlformats.org/presentationml/2006/main">
+  <p:cSld>
+    <p:spTree>
+      <p:nvGrpSpPr>
+        <p:cNvPr id="1" name=""/>
+        <p:cNvGrpSpPr/>
+        <p:nvPr/>
+      </p:nvGrpSpPr>
+      <p:grpSpPr>
+        <a:xfrm>
+          <a:off x="0" y="0"/>
+          <a:ext cx="0" cy="0"/>
+          <a:chOff x="0" y="0"/>
+          <a:chExt cx="0" cy="0"/>
+        </a:xfrm>
+      </p:grpSpPr>
+      <p:sp>
+        <p:nvSpPr>
+          <p:cNvPr id="2" name="Title 1">
+            <a:extLst>
+              <a:ext uri="{FF2B5EF4-FFF2-40B4-BE49-F238E27FC236}">
+                <a16:creationId xmlns:a16="http://schemas.microsoft.com/office/drawing/2014/main" id="{1A1B75CE-271D-48FB-82BD-3BADE505A17C}"/>
+              </a:ext>
+            </a:extLst>
+          </p:cNvPr>
+          <p:cNvSpPr>
+            <a:spLocks noGrp="1"/>
+          </p:cNvSpPr>
+          <p:nvPr>
+            <p:ph type="title"/>
+          </p:nvPr>
+        </p:nvSpPr>
+        <p:spPr/>
+        <p:txBody>
+          <a:bodyPr/>
+          <a:lstStyle/>
+          <a:p>
+            <a:r>
+              <a:rPr lang="en-US" dirty="0"/>
+              <a:t>Conclusion and Final Remarks</a:t>
+            </a:r>
+          </a:p>
+        </p:txBody>
+      </p:sp>
+      <p:sp>
+        <p:nvSpPr>
+          <p:cNvPr id="3" name="Content Placeholder 2">
+            <a:extLst>
+              <a:ext uri="{FF2B5EF4-FFF2-40B4-BE49-F238E27FC236}">
+                <a16:creationId xmlns:a16="http://schemas.microsoft.com/office/drawing/2014/main" id="{66D0B58D-CDE0-4DEF-9CDF-DF1D09AAB349}"/>
+              </a:ext>
+            </a:extLst>
+          </p:cNvPr>
+          <p:cNvSpPr>
+            <a:spLocks noGrp="1"/>
+          </p:cNvSpPr>
+          <p:nvPr>
+            <p:ph idx="1"/>
+          </p:nvPr>
+        </p:nvSpPr>
+        <p:spPr/>
+        <p:txBody>
+          <a:bodyPr/>
+          <a:lstStyle/>
+          <a:p>
+            <a:r>
+              <a:rPr lang="en-US" dirty="0"/>
+              <a:t>Stuff…</a:t>
+            </a:r>
+          </a:p>
+        </p:txBody>
+      </p:sp>
+    </p:spTree>
+    <p:extLst>
+      <p:ext uri="{BB962C8B-B14F-4D97-AF65-F5344CB8AC3E}">
+        <p14:creationId xmlns:p14="http://schemas.microsoft.com/office/powerpoint/2010/main" val="2558569331"/>
+      </p:ext>
+    </p:extLst>
+  </p:cSld>
+  <p:clrMapOvr>
+    <a:masterClrMapping/>
+  </p:clrMapOvr>
+</p:sld>
+</file>
+
 <file path=ppt/slides/slide2.xml><?xml version="1.0" encoding="utf-8"?>
 <p:sld xmlns:a="http://schemas.openxmlformats.org/drawingml/2006/main" xmlns:r="http://schemas.openxmlformats.org/officeDocument/2006/relationships" xmlns:p="http://schemas.openxmlformats.org/presentationml/2006/main">
   <p:cSld>
@@ -3877,7 +4594,7 @@
           <p:cNvPr id="2" name="Title 1">
             <a:extLst>
               <a:ext uri="{FF2B5EF4-FFF2-40B4-BE49-F238E27FC236}">
-                <a16:creationId xmlns:a16="http://schemas.microsoft.com/office/drawing/2014/main" id="{8CD52B8C-8426-49F4-AC7E-2AD658F417D4}"/>
+                <a16:creationId xmlns:a16="http://schemas.microsoft.com/office/drawing/2014/main" id="{6949BED7-C4E0-465E-85F1-97183C53B6D7}"/>
               </a:ext>
             </a:extLst>
           </p:cNvPr>
@@ -3895,7 +4612,7 @@
           <a:p>
             <a:r>
               <a:rPr lang="en-US" dirty="0"/>
-              <a:t>Project Infrastructure &amp; Software</a:t>
+              <a:t>Demonstration</a:t>
             </a:r>
           </a:p>
         </p:txBody>
@@ -3905,7 +4622,7 @@
           <p:cNvPr id="3" name="Content Placeholder 2">
             <a:extLst>
               <a:ext uri="{FF2B5EF4-FFF2-40B4-BE49-F238E27FC236}">
-                <a16:creationId xmlns:a16="http://schemas.microsoft.com/office/drawing/2014/main" id="{F23B04C2-FDA2-46BA-BB36-6F4198252183}"/>
+                <a16:creationId xmlns:a16="http://schemas.microsoft.com/office/drawing/2014/main" id="{6B0208A4-9D1D-499D-B39E-C939139216E5}"/>
               </a:ext>
             </a:extLst>
           </p:cNvPr>
@@ -3921,17 +4638,14 @@
           <a:bodyPr/>
           <a:lstStyle/>
           <a:p>
-            <a:r>
-              <a:rPr lang="en-US" dirty="0"/>
-              <a:t>Presented by Brian Bauer</a:t>
-            </a:r>
+            <a:endParaRPr lang="en-US" dirty="0"/>
           </a:p>
         </p:txBody>
       </p:sp>
     </p:spTree>
     <p:extLst>
       <p:ext uri="{BB962C8B-B14F-4D97-AF65-F5344CB8AC3E}">
-        <p14:creationId xmlns:p14="http://schemas.microsoft.com/office/powerpoint/2010/main" val="4064571591"/>
+        <p14:creationId xmlns:p14="http://schemas.microsoft.com/office/powerpoint/2010/main" val="2999053625"/>
       </p:ext>
     </p:extLst>
   </p:cSld>
@@ -4140,7 +4854,7 @@
           <p:cNvPr id="2" name="Title 1">
             <a:extLst>
               <a:ext uri="{FF2B5EF4-FFF2-40B4-BE49-F238E27FC236}">
-                <a16:creationId xmlns:a16="http://schemas.microsoft.com/office/drawing/2014/main" id="{1A1B75CE-271D-48FB-82BD-3BADE505A17C}"/>
+                <a16:creationId xmlns:a16="http://schemas.microsoft.com/office/drawing/2014/main" id="{8CD52B8C-8426-49F4-AC7E-2AD658F417D4}"/>
               </a:ext>
             </a:extLst>
           </p:cNvPr>
@@ -4158,7 +4872,7 @@
           <a:p>
             <a:r>
               <a:rPr lang="en-US" dirty="0"/>
-              <a:t>Conclusion and Final Remarks</a:t>
+              <a:t>Project Infrastructure &amp; Software</a:t>
             </a:r>
           </a:p>
         </p:txBody>
@@ -4168,7 +4882,7 @@
           <p:cNvPr id="3" name="Content Placeholder 2">
             <a:extLst>
               <a:ext uri="{FF2B5EF4-FFF2-40B4-BE49-F238E27FC236}">
-                <a16:creationId xmlns:a16="http://schemas.microsoft.com/office/drawing/2014/main" id="{66D0B58D-CDE0-4DEF-9CDF-DF1D09AAB349}"/>
+                <a16:creationId xmlns:a16="http://schemas.microsoft.com/office/drawing/2014/main" id="{F23B04C2-FDA2-46BA-BB36-6F4198252183}"/>
               </a:ext>
             </a:extLst>
           </p:cNvPr>
@@ -4186,11 +4900,7 @@
           <a:p>
             <a:r>
               <a:rPr lang="en-US" dirty="0"/>
-              <a:t>Demo </a:t>
-            </a:r>
-            <a:r>
-              <a:rPr lang="en-US"/>
-              <a:t>to follow</a:t>
+              <a:t>Presented by Brian Bauer</a:t>
             </a:r>
           </a:p>
         </p:txBody>
@@ -4198,7 +4908,7 @@
     </p:spTree>
     <p:extLst>
       <p:ext uri="{BB962C8B-B14F-4D97-AF65-F5344CB8AC3E}">
-        <p14:creationId xmlns:p14="http://schemas.microsoft.com/office/powerpoint/2010/main" val="2558569331"/>
+        <p14:creationId xmlns:p14="http://schemas.microsoft.com/office/powerpoint/2010/main" val="4064571591"/>
       </p:ext>
     </p:extLst>
   </p:cSld>
@@ -4501,4 +5211,299 @@
     </a:ext>
   </a:extLst>
 </a:theme>
+</file>
+
+<file path=ppt/theme/theme2.xml><?xml version="1.0" encoding="utf-8"?>
+<a:theme xmlns:a="http://schemas.openxmlformats.org/drawingml/2006/main" name="Office Theme">
+  <a:themeElements>
+    <a:clrScheme name="Office">
+      <a:dk1>
+        <a:sysClr val="windowText" lastClr="000000"/>
+      </a:dk1>
+      <a:lt1>
+        <a:sysClr val="window" lastClr="FFFFFF"/>
+      </a:lt1>
+      <a:dk2>
+        <a:srgbClr val="44546A"/>
+      </a:dk2>
+      <a:lt2>
+        <a:srgbClr val="E7E6E6"/>
+      </a:lt2>
+      <a:accent1>
+        <a:srgbClr val="4472C4"/>
+      </a:accent1>
+      <a:accent2>
+        <a:srgbClr val="ED7D31"/>
+      </a:accent2>
+      <a:accent3>
+        <a:srgbClr val="A5A5A5"/>
+      </a:accent3>
+      <a:accent4>
+        <a:srgbClr val="FFC000"/>
+      </a:accent4>
+      <a:accent5>
+        <a:srgbClr val="5B9BD5"/>
+      </a:accent5>
+      <a:accent6>
+        <a:srgbClr val="70AD47"/>
+      </a:accent6>
+      <a:hlink>
+        <a:srgbClr val="0563C1"/>
+      </a:hlink>
+      <a:folHlink>
+        <a:srgbClr val="954F72"/>
+      </a:folHlink>
+    </a:clrScheme>
+    <a:fontScheme name="Office">
+      <a:majorFont>
+        <a:latin typeface="Calibri Light" panose="020F0302020204030204"/>
+        <a:ea typeface=""/>
+        <a:cs typeface=""/>
+        <a:font script="Jpan" typeface="游ゴシック Light"/>
+        <a:font script="Hang" typeface="맑은 고딕"/>
+        <a:font script="Hans" typeface="等线 Light"/>
+        <a:font script="Hant" typeface="新細明體"/>
+        <a:font script="Arab" typeface="Times New Roman"/>
+        <a:font script="Hebr" typeface="Times New Roman"/>
+        <a:font script="Thai" typeface="Angsana New"/>
+        <a:font script="Ethi" typeface="Nyala"/>
+        <a:font script="Beng" typeface="Vrinda"/>
+        <a:font script="Gujr" typeface="Shruti"/>
+        <a:font script="Khmr" typeface="MoolBoran"/>
+        <a:font script="Knda" typeface="Tunga"/>
+        <a:font script="Guru" typeface="Raavi"/>
+        <a:font script="Cans" typeface="Euphemia"/>
+        <a:font script="Cher" typeface="Plantagenet Cherokee"/>
+        <a:font script="Yiii" typeface="Microsoft Yi Baiti"/>
+        <a:font script="Tibt" typeface="Microsoft Himalaya"/>
+        <a:font script="Thaa" typeface="MV Boli"/>
+        <a:font script="Deva" typeface="Mangal"/>
+        <a:font script="Telu" typeface="Gautami"/>
+        <a:font script="Taml" typeface="Latha"/>
+        <a:font script="Syrc" typeface="Estrangelo Edessa"/>
+        <a:font script="Orya" typeface="Kalinga"/>
+        <a:font script="Mlym" typeface="Kartika"/>
+        <a:font script="Laoo" typeface="DokChampa"/>
+        <a:font script="Sinh" typeface="Iskoola Pota"/>
+        <a:font script="Mong" typeface="Mongolian Baiti"/>
+        <a:font script="Viet" typeface="Times New Roman"/>
+        <a:font script="Uigh" typeface="Microsoft Uighur"/>
+        <a:font script="Geor" typeface="Sylfaen"/>
+        <a:font script="Armn" typeface="Arial"/>
+        <a:font script="Bugi" typeface="Leelawadee UI"/>
+        <a:font script="Bopo" typeface="Microsoft JhengHei"/>
+        <a:font script="Java" typeface="Javanese Text"/>
+        <a:font script="Lisu" typeface="Segoe UI"/>
+        <a:font script="Mymr" typeface="Myanmar Text"/>
+        <a:font script="Nkoo" typeface="Ebrima"/>
+        <a:font script="Olck" typeface="Nirmala UI"/>
+        <a:font script="Osma" typeface="Ebrima"/>
+        <a:font script="Phag" typeface="Phagspa"/>
+        <a:font script="Syrn" typeface="Estrangelo Edessa"/>
+        <a:font script="Syrj" typeface="Estrangelo Edessa"/>
+        <a:font script="Syre" typeface="Estrangelo Edessa"/>
+        <a:font script="Sora" typeface="Nirmala UI"/>
+        <a:font script="Tale" typeface="Microsoft Tai Le"/>
+        <a:font script="Talu" typeface="Microsoft New Tai Lue"/>
+        <a:font script="Tfng" typeface="Ebrima"/>
+      </a:majorFont>
+      <a:minorFont>
+        <a:latin typeface="Calibri" panose="020F0502020204030204"/>
+        <a:ea typeface=""/>
+        <a:cs typeface=""/>
+        <a:font script="Jpan" typeface="游ゴシック"/>
+        <a:font script="Hang" typeface="맑은 고딕"/>
+        <a:font script="Hans" typeface="等线"/>
+        <a:font script="Hant" typeface="新細明體"/>
+        <a:font script="Arab" typeface="Arial"/>
+        <a:font script="Hebr" typeface="Arial"/>
+        <a:font script="Thai" typeface="Cordia New"/>
+        <a:font script="Ethi" typeface="Nyala"/>
+        <a:font script="Beng" typeface="Vrinda"/>
+        <a:font script="Gujr" typeface="Shruti"/>
+        <a:font script="Khmr" typeface="DaunPenh"/>
+        <a:font script="Knda" typeface="Tunga"/>
+        <a:font script="Guru" typeface="Raavi"/>
+        <a:font script="Cans" typeface="Euphemia"/>
+        <a:font script="Cher" typeface="Plantagenet Cherokee"/>
+        <a:font script="Yiii" typeface="Microsoft Yi Baiti"/>
+        <a:font script="Tibt" typeface="Microsoft Himalaya"/>
+        <a:font script="Thaa" typeface="MV Boli"/>
+        <a:font script="Deva" typeface="Mangal"/>
+        <a:font script="Telu" typeface="Gautami"/>
+        <a:font script="Taml" typeface="Latha"/>
+        <a:font script="Syrc" typeface="Estrangelo Edessa"/>
+        <a:font script="Orya" typeface="Kalinga"/>
+        <a:font script="Mlym" typeface="Kartika"/>
+        <a:font script="Laoo" typeface="DokChampa"/>
+        <a:font script="Sinh" typeface="Iskoola Pota"/>
+        <a:font script="Mong" typeface="Mongolian Baiti"/>
+        <a:font script="Viet" typeface="Arial"/>
+        <a:font script="Uigh" typeface="Microsoft Uighur"/>
+        <a:font script="Geor" typeface="Sylfaen"/>
+        <a:font script="Armn" typeface="Arial"/>
+        <a:font script="Bugi" typeface="Leelawadee UI"/>
+        <a:font script="Bopo" typeface="Microsoft JhengHei"/>
+        <a:font script="Java" typeface="Javanese Text"/>
+        <a:font script="Lisu" typeface="Segoe UI"/>
+        <a:font script="Mymr" typeface="Myanmar Text"/>
+        <a:font script="Nkoo" typeface="Ebrima"/>
+        <a:font script="Olck" typeface="Nirmala UI"/>
+        <a:font script="Osma" typeface="Ebrima"/>
+        <a:font script="Phag" typeface="Phagspa"/>
+        <a:font script="Syrn" typeface="Estrangelo Edessa"/>
+        <a:font script="Syrj" typeface="Estrangelo Edessa"/>
+        <a:font script="Syre" typeface="Estrangelo Edessa"/>
+        <a:font script="Sora" typeface="Nirmala UI"/>
+        <a:font script="Tale" typeface="Microsoft Tai Le"/>
+        <a:font script="Talu" typeface="Microsoft New Tai Lue"/>
+        <a:font script="Tfng" typeface="Ebrima"/>
+      </a:minorFont>
+    </a:fontScheme>
+    <a:fmtScheme name="Office">
+      <a:fillStyleLst>
+        <a:solidFill>
+          <a:schemeClr val="phClr"/>
+        </a:solidFill>
+        <a:gradFill rotWithShape="1">
+          <a:gsLst>
+            <a:gs pos="0">
+              <a:schemeClr val="phClr">
+                <a:lumMod val="110000"/>
+                <a:satMod val="105000"/>
+                <a:tint val="67000"/>
+              </a:schemeClr>
+            </a:gs>
+            <a:gs pos="50000">
+              <a:schemeClr val="phClr">
+                <a:lumMod val="105000"/>
+                <a:satMod val="103000"/>
+                <a:tint val="73000"/>
+              </a:schemeClr>
+            </a:gs>
+            <a:gs pos="100000">
+              <a:schemeClr val="phClr">
+                <a:lumMod val="105000"/>
+                <a:satMod val="109000"/>
+                <a:tint val="81000"/>
+              </a:schemeClr>
+            </a:gs>
+          </a:gsLst>
+          <a:lin ang="5400000" scaled="0"/>
+        </a:gradFill>
+        <a:gradFill rotWithShape="1">
+          <a:gsLst>
+            <a:gs pos="0">
+              <a:schemeClr val="phClr">
+                <a:satMod val="103000"/>
+                <a:lumMod val="102000"/>
+                <a:tint val="94000"/>
+              </a:schemeClr>
+            </a:gs>
+            <a:gs pos="50000">
+              <a:schemeClr val="phClr">
+                <a:satMod val="110000"/>
+                <a:lumMod val="100000"/>
+                <a:shade val="100000"/>
+              </a:schemeClr>
+            </a:gs>
+            <a:gs pos="100000">
+              <a:schemeClr val="phClr">
+                <a:lumMod val="99000"/>
+                <a:satMod val="120000"/>
+                <a:shade val="78000"/>
+              </a:schemeClr>
+            </a:gs>
+          </a:gsLst>
+          <a:lin ang="5400000" scaled="0"/>
+        </a:gradFill>
+      </a:fillStyleLst>
+      <a:lnStyleLst>
+        <a:ln w="6350" cap="flat" cmpd="sng" algn="ctr">
+          <a:solidFill>
+            <a:schemeClr val="phClr"/>
+          </a:solidFill>
+          <a:prstDash val="solid"/>
+          <a:miter lim="800000"/>
+        </a:ln>
+        <a:ln w="12700" cap="flat" cmpd="sng" algn="ctr">
+          <a:solidFill>
+            <a:schemeClr val="phClr"/>
+          </a:solidFill>
+          <a:prstDash val="solid"/>
+          <a:miter lim="800000"/>
+        </a:ln>
+        <a:ln w="19050" cap="flat" cmpd="sng" algn="ctr">
+          <a:solidFill>
+            <a:schemeClr val="phClr"/>
+          </a:solidFill>
+          <a:prstDash val="solid"/>
+          <a:miter lim="800000"/>
+        </a:ln>
+      </a:lnStyleLst>
+      <a:effectStyleLst>
+        <a:effectStyle>
+          <a:effectLst/>
+        </a:effectStyle>
+        <a:effectStyle>
+          <a:effectLst/>
+        </a:effectStyle>
+        <a:effectStyle>
+          <a:effectLst>
+            <a:outerShdw blurRad="57150" dist="19050" dir="5400000" algn="ctr" rotWithShape="0">
+              <a:srgbClr val="000000">
+                <a:alpha val="63000"/>
+              </a:srgbClr>
+            </a:outerShdw>
+          </a:effectLst>
+        </a:effectStyle>
+      </a:effectStyleLst>
+      <a:bgFillStyleLst>
+        <a:solidFill>
+          <a:schemeClr val="phClr"/>
+        </a:solidFill>
+        <a:solidFill>
+          <a:schemeClr val="phClr">
+            <a:tint val="95000"/>
+            <a:satMod val="170000"/>
+          </a:schemeClr>
+        </a:solidFill>
+        <a:gradFill rotWithShape="1">
+          <a:gsLst>
+            <a:gs pos="0">
+              <a:schemeClr val="phClr">
+                <a:tint val="93000"/>
+                <a:satMod val="150000"/>
+                <a:shade val="98000"/>
+                <a:lumMod val="102000"/>
+              </a:schemeClr>
+            </a:gs>
+            <a:gs pos="50000">
+              <a:schemeClr val="phClr">
+                <a:tint val="98000"/>
+                <a:satMod val="130000"/>
+                <a:shade val="90000"/>
+                <a:lumMod val="103000"/>
+              </a:schemeClr>
+            </a:gs>
+            <a:gs pos="100000">
+              <a:schemeClr val="phClr">
+                <a:shade val="63000"/>
+                <a:satMod val="120000"/>
+              </a:schemeClr>
+            </a:gs>
+          </a:gsLst>
+          <a:lin ang="5400000" scaled="0"/>
+        </a:gradFill>
+      </a:bgFillStyleLst>
+    </a:fmtScheme>
+  </a:themeElements>
+  <a:objectDefaults/>
+  <a:extraClrSchemeLst/>
+  <a:extLst>
+    <a:ext uri="{05A4C25C-085E-4340-85A3-A5531E510DB2}">
+      <thm15:themeFamily xmlns:thm15="http://schemas.microsoft.com/office/thememl/2012/main" name="Office Theme" id="{62F939B6-93AF-4DB8-9C6B-D6C7DFDC589F}" vid="{4A3C46E8-61CC-4603-A589-7422A47A8E4A}"/>
+    </a:ext>
+  </a:extLst>
+</a:theme>
 </file>
</xml_diff>